<commit_message>
adding more topics to ppt
</commit_message>
<xml_diff>
--- a/Introduction_to_Java_8_for_Grade_10_Students.pptx
+++ b/Introduction_to_Java_8_for_Grade_10_Students.pptx
@@ -5,10 +5,10 @@
     <p:sldMasterId id="2147483648" r:id="rId1"/>
   </p:sldMasterIdLst>
   <p:notesMasterIdLst>
-    <p:notesMasterId r:id="rId21"/>
+    <p:notesMasterId r:id="rId22"/>
   </p:notesMasterIdLst>
   <p:handoutMasterIdLst>
-    <p:handoutMasterId r:id="rId22"/>
+    <p:handoutMasterId r:id="rId23"/>
   </p:handoutMasterIdLst>
   <p:sldIdLst>
     <p:sldId id="256" r:id="rId2"/>
@@ -21,15 +21,16 @@
     <p:sldId id="272" r:id="rId9"/>
     <p:sldId id="273" r:id="rId10"/>
     <p:sldId id="274" r:id="rId11"/>
-    <p:sldId id="267" r:id="rId12"/>
-    <p:sldId id="258" r:id="rId13"/>
-    <p:sldId id="259" r:id="rId14"/>
-    <p:sldId id="260" r:id="rId15"/>
-    <p:sldId id="261" r:id="rId16"/>
-    <p:sldId id="262" r:id="rId17"/>
-    <p:sldId id="263" r:id="rId18"/>
-    <p:sldId id="264" r:id="rId19"/>
-    <p:sldId id="265" r:id="rId20"/>
+    <p:sldId id="275" r:id="rId12"/>
+    <p:sldId id="267" r:id="rId13"/>
+    <p:sldId id="258" r:id="rId14"/>
+    <p:sldId id="259" r:id="rId15"/>
+    <p:sldId id="260" r:id="rId16"/>
+    <p:sldId id="261" r:id="rId17"/>
+    <p:sldId id="262" r:id="rId18"/>
+    <p:sldId id="263" r:id="rId19"/>
+    <p:sldId id="264" r:id="rId20"/>
+    <p:sldId id="265" r:id="rId21"/>
   </p:sldIdLst>
   <p:sldSz cx="9144000" cy="6858000" type="screen4x3"/>
   <p:notesSz cx="6858000" cy="9144000"/>
@@ -4279,45 +4280,34 @@
             <p:ph type="title"/>
           </p:nvPr>
         </p:nvSpPr>
-        <p:spPr/>
-        <p:txBody>
-          <a:bodyPr/>
-          <a:lstStyle/>
-          <a:p>
-            <a:r>
-              <a:t>What is Java?</a:t>
-            </a:r>
-          </a:p>
-        </p:txBody>
-      </p:sp>
-      <p:sp>
-        <p:nvSpPr>
-          <p:cNvPr id="3" name="Content Placeholder 2"/>
-          <p:cNvSpPr>
-            <a:spLocks noGrp="1"/>
-          </p:cNvSpPr>
-          <p:nvPr>
-            <p:ph idx="1"/>
-          </p:nvPr>
-        </p:nvSpPr>
-        <p:spPr/>
-        <p:txBody>
-          <a:bodyPr/>
-          <a:lstStyle/>
-          <a:p>
-            <a:r>
-              <a:t>Java is a programming language and computing platform.</a:t>
-            </a:r>
-          </a:p>
-          <a:p>
-            <a:r>
-              <a:t>It is used in various areas such as mobile apps, web applications, games, and bank software.</a:t>
-            </a:r>
-          </a:p>
-          <a:p>
-            <a:r>
-              <a:t>Java has evolved over time, leading up to Java 8.</a:t>
-            </a:r>
+        <p:spPr>
+          <a:xfrm>
+            <a:off x="457200" y="274637"/>
+            <a:ext cx="8573784" cy="2037047"/>
+          </a:xfrm>
+        </p:spPr>
+        <p:txBody>
+          <a:bodyPr>
+            <a:normAutofit/>
+          </a:bodyPr>
+          <a:lstStyle/>
+          <a:p>
+            <a:r>
+              <a:rPr sz="3600" dirty="0"/>
+              <a:t>W</a:t>
+            </a:r>
+            <a:r>
+              <a:rPr lang="en-CA" sz="3600" dirty="0"/>
+              <a:t>ere does Programming Language </a:t>
+            </a:r>
+            <a:br>
+              <a:rPr lang="en-CA" sz="3600" dirty="0"/>
+            </a:br>
+            <a:r>
+              <a:rPr lang="en-CA" sz="3600" dirty="0"/>
+              <a:t>come in?</a:t>
+            </a:r>
+            <a:endParaRPr sz="3600" dirty="0"/>
           </a:p>
         </p:txBody>
       </p:sp>
@@ -4408,10 +4398,44 @@
           </a:p>
         </p:txBody>
       </p:sp>
+      <p:sp>
+        <p:nvSpPr>
+          <p:cNvPr id="9" name="Content Placeholder 8">
+            <a:extLst>
+              <a:ext uri="{FF2B5EF4-FFF2-40B4-BE49-F238E27FC236}">
+                <a16:creationId xmlns:a16="http://schemas.microsoft.com/office/drawing/2014/main" id="{B604709A-DC3A-4690-A915-91A995963D24}"/>
+              </a:ext>
+            </a:extLst>
+          </p:cNvPr>
+          <p:cNvSpPr>
+            <a:spLocks noGrp="1"/>
+          </p:cNvSpPr>
+          <p:nvPr>
+            <p:ph idx="1"/>
+          </p:nvPr>
+        </p:nvSpPr>
+        <p:spPr/>
+        <p:txBody>
+          <a:bodyPr/>
+          <a:lstStyle/>
+          <a:p>
+            <a:endParaRPr lang="en-CA" dirty="0"/>
+          </a:p>
+          <a:p>
+            <a:endParaRPr lang="en-CA" dirty="0"/>
+          </a:p>
+          <a:p>
+            <a:r>
+              <a:rPr lang="en-CA" dirty="0"/>
+              <a:t>Programming languages will be compiled into machine code that is understood by CPU</a:t>
+            </a:r>
+          </a:p>
+        </p:txBody>
+      </p:sp>
     </p:spTree>
     <p:extLst>
       <p:ext uri="{BB962C8B-B14F-4D97-AF65-F5344CB8AC3E}">
-        <p14:creationId xmlns:p14="http://schemas.microsoft.com/office/powerpoint/2010/main" val="49044795"/>
+        <p14:creationId xmlns:p14="http://schemas.microsoft.com/office/powerpoint/2010/main" val="3569006237"/>
       </p:ext>
     </p:extLst>
   </p:cSld>
@@ -4454,7 +4478,7 @@
           <a:lstStyle/>
           <a:p>
             <a:r>
-              <a:t>Why Learn Java?</a:t>
+              <a:t>What is Java?</a:t>
             </a:r>
           </a:p>
         </p:txBody>
@@ -4475,17 +4499,17 @@
           <a:lstStyle/>
           <a:p>
             <a:r>
-              <a:t>Java is one of the most popular programming languages in the world.</a:t>
-            </a:r>
-          </a:p>
-          <a:p>
-            <a:r>
-              <a:t>It offers benefits such as platform independence, strong memory management, and security features.</a:t>
-            </a:r>
-          </a:p>
-          <a:p>
-            <a:r>
-              <a:t>Learning Java opens up a wide range of career opportunities in software development.</a:t>
+              <a:t>Java is a programming language and computing platform.</a:t>
+            </a:r>
+          </a:p>
+          <a:p>
+            <a:r>
+              <a:t>It is used in various areas such as mobile apps, web applications, games, and bank software.</a:t>
+            </a:r>
+          </a:p>
+          <a:p>
+            <a:r>
+              <a:t>Java has evolved over time, leading up to Java 8.</a:t>
             </a:r>
           </a:p>
         </p:txBody>
@@ -4495,7 +4519,7 @@
           <p:cNvPr id="4" name="Date Placeholder 3">
             <a:extLst>
               <a:ext uri="{FF2B5EF4-FFF2-40B4-BE49-F238E27FC236}">
-                <a16:creationId xmlns:a16="http://schemas.microsoft.com/office/drawing/2014/main" id="{6085965C-D9EE-4CF6-8805-E04F1097EC92}"/>
+                <a16:creationId xmlns:a16="http://schemas.microsoft.com/office/drawing/2014/main" id="{70D2D55E-E8FD-4B34-BD27-C14ED9815D8B}"/>
               </a:ext>
             </a:extLst>
           </p:cNvPr>
@@ -4511,7 +4535,7 @@
           <a:bodyPr/>
           <a:lstStyle/>
           <a:p>
-            <a:fld id="{38094CEE-5F31-4EB1-AD37-805759270AF3}" type="datetime1">
+            <a:fld id="{2BEC5103-41C2-4753-9A5D-54D3476FCAC0}" type="datetime1">
               <a:rPr lang="en-US" smtClean="0"/>
               <a:t>12/10/2024</a:t>
             </a:fld>
@@ -4524,7 +4548,7 @@
           <p:cNvPr id="5" name="Footer Placeholder 4">
             <a:extLst>
               <a:ext uri="{FF2B5EF4-FFF2-40B4-BE49-F238E27FC236}">
-                <a16:creationId xmlns:a16="http://schemas.microsoft.com/office/drawing/2014/main" id="{B2DAC55E-393E-4646-94AA-EF69D4F3CE0A}"/>
+                <a16:creationId xmlns:a16="http://schemas.microsoft.com/office/drawing/2014/main" id="{711B9911-AAEF-430B-845E-9DF47E1505BA}"/>
               </a:ext>
             </a:extLst>
           </p:cNvPr>
@@ -4553,7 +4577,7 @@
           <p:cNvPr id="6" name="Slide Number Placeholder 5">
             <a:extLst>
               <a:ext uri="{FF2B5EF4-FFF2-40B4-BE49-F238E27FC236}">
-                <a16:creationId xmlns:a16="http://schemas.microsoft.com/office/drawing/2014/main" id="{1F4CAB76-8648-45D8-AFC6-ACB5A6D41BDA}"/>
+                <a16:creationId xmlns:a16="http://schemas.microsoft.com/office/drawing/2014/main" id="{6A853133-7F41-415A-8C9D-74230DE24FB6}"/>
               </a:ext>
             </a:extLst>
           </p:cNvPr>
@@ -4578,6 +4602,11 @@
         </p:txBody>
       </p:sp>
     </p:spTree>
+    <p:extLst>
+      <p:ext uri="{BB962C8B-B14F-4D97-AF65-F5344CB8AC3E}">
+        <p14:creationId xmlns:p14="http://schemas.microsoft.com/office/powerpoint/2010/main" val="49044795"/>
+      </p:ext>
+    </p:extLst>
   </p:cSld>
   <p:clrMapOvr>
     <a:masterClrMapping/>
@@ -4618,7 +4647,7 @@
           <a:lstStyle/>
           <a:p>
             <a:r>
-              <a:t>Getting Started with Java</a:t>
+              <a:t>Why Learn Java?</a:t>
             </a:r>
           </a:p>
         </p:txBody>
@@ -4639,17 +4668,17 @@
           <a:lstStyle/>
           <a:p>
             <a:r>
-              <a:t>To start, you need to install Java on your computer.</a:t>
-            </a:r>
-          </a:p>
-          <a:p>
-            <a:r>
-              <a:t>Setting up the environment includes installing the Java Development Kit (JDK) and an Integrated Development Environment (IDE).</a:t>
-            </a:r>
-          </a:p>
-          <a:p>
-            <a:r>
-              <a:t>Example of a simple Java program to print 'Hello, World!'</a:t>
+              <a:t>Java is one of the most popular programming languages in the world.</a:t>
+            </a:r>
+          </a:p>
+          <a:p>
+            <a:r>
+              <a:t>It offers benefits such as platform independence, strong memory management, and security features.</a:t>
+            </a:r>
+          </a:p>
+          <a:p>
+            <a:r>
+              <a:t>Learning Java opens up a wide range of career opportunities in software development.</a:t>
             </a:r>
           </a:p>
         </p:txBody>
@@ -4659,7 +4688,7 @@
           <p:cNvPr id="4" name="Date Placeholder 3">
             <a:extLst>
               <a:ext uri="{FF2B5EF4-FFF2-40B4-BE49-F238E27FC236}">
-                <a16:creationId xmlns:a16="http://schemas.microsoft.com/office/drawing/2014/main" id="{4CFB1BC4-B861-4A96-9570-2305B26E52EA}"/>
+                <a16:creationId xmlns:a16="http://schemas.microsoft.com/office/drawing/2014/main" id="{6085965C-D9EE-4CF6-8805-E04F1097EC92}"/>
               </a:ext>
             </a:extLst>
           </p:cNvPr>
@@ -4675,7 +4704,7 @@
           <a:bodyPr/>
           <a:lstStyle/>
           <a:p>
-            <a:fld id="{D874F0C9-A6B4-49B7-A1B5-29FD97D6973B}" type="datetime1">
+            <a:fld id="{38094CEE-5F31-4EB1-AD37-805759270AF3}" type="datetime1">
               <a:rPr lang="en-US" smtClean="0"/>
               <a:t>12/10/2024</a:t>
             </a:fld>
@@ -4688,7 +4717,7 @@
           <p:cNvPr id="5" name="Footer Placeholder 4">
             <a:extLst>
               <a:ext uri="{FF2B5EF4-FFF2-40B4-BE49-F238E27FC236}">
-                <a16:creationId xmlns:a16="http://schemas.microsoft.com/office/drawing/2014/main" id="{CDBDD827-7A08-4534-86EB-34C5C8450622}"/>
+                <a16:creationId xmlns:a16="http://schemas.microsoft.com/office/drawing/2014/main" id="{B2DAC55E-393E-4646-94AA-EF69D4F3CE0A}"/>
               </a:ext>
             </a:extLst>
           </p:cNvPr>
@@ -4717,7 +4746,7 @@
           <p:cNvPr id="6" name="Slide Number Placeholder 5">
             <a:extLst>
               <a:ext uri="{FF2B5EF4-FFF2-40B4-BE49-F238E27FC236}">
-                <a16:creationId xmlns:a16="http://schemas.microsoft.com/office/drawing/2014/main" id="{4393C6A1-8542-49B2-84CE-1FFA40E83FF9}"/>
+                <a16:creationId xmlns:a16="http://schemas.microsoft.com/office/drawing/2014/main" id="{1F4CAB76-8648-45D8-AFC6-ACB5A6D41BDA}"/>
               </a:ext>
             </a:extLst>
           </p:cNvPr>
@@ -4782,7 +4811,7 @@
           <a:lstStyle/>
           <a:p>
             <a:r>
-              <a:t>Basic Concepts in Java</a:t>
+              <a:t>Getting Started with Java</a:t>
             </a:r>
           </a:p>
         </p:txBody>
@@ -4803,17 +4832,17 @@
           <a:lstStyle/>
           <a:p>
             <a:r>
-              <a:t>Variables are used to store information.</a:t>
-            </a:r>
-          </a:p>
-          <a:p>
-            <a:r>
-              <a:t>Java has several primitive data types like int, char, and boolean.</a:t>
-            </a:r>
-          </a:p>
-          <a:p>
-            <a:r>
-              <a:t>Basic operators include addition, subtraction, multiplication, etc.</a:t>
+              <a:t>To start, you need to install Java on your computer.</a:t>
+            </a:r>
+          </a:p>
+          <a:p>
+            <a:r>
+              <a:t>Setting up the environment includes installing the Java Development Kit (JDK) and an Integrated Development Environment (IDE).</a:t>
+            </a:r>
+          </a:p>
+          <a:p>
+            <a:r>
+              <a:t>Example of a simple Java program to print 'Hello, World!'</a:t>
             </a:r>
           </a:p>
         </p:txBody>
@@ -4823,7 +4852,7 @@
           <p:cNvPr id="4" name="Date Placeholder 3">
             <a:extLst>
               <a:ext uri="{FF2B5EF4-FFF2-40B4-BE49-F238E27FC236}">
-                <a16:creationId xmlns:a16="http://schemas.microsoft.com/office/drawing/2014/main" id="{FE54D3CD-48D8-4544-B3FF-CEFC4924FCBC}"/>
+                <a16:creationId xmlns:a16="http://schemas.microsoft.com/office/drawing/2014/main" id="{4CFB1BC4-B861-4A96-9570-2305B26E52EA}"/>
               </a:ext>
             </a:extLst>
           </p:cNvPr>
@@ -4839,7 +4868,7 @@
           <a:bodyPr/>
           <a:lstStyle/>
           <a:p>
-            <a:fld id="{ADA47287-F64F-4BFB-8B4E-FF16577CD6D4}" type="datetime1">
+            <a:fld id="{D874F0C9-A6B4-49B7-A1B5-29FD97D6973B}" type="datetime1">
               <a:rPr lang="en-US" smtClean="0"/>
               <a:t>12/10/2024</a:t>
             </a:fld>
@@ -4852,7 +4881,7 @@
           <p:cNvPr id="5" name="Footer Placeholder 4">
             <a:extLst>
               <a:ext uri="{FF2B5EF4-FFF2-40B4-BE49-F238E27FC236}">
-                <a16:creationId xmlns:a16="http://schemas.microsoft.com/office/drawing/2014/main" id="{8681563A-3FBE-4299-B083-560AFC2101FE}"/>
+                <a16:creationId xmlns:a16="http://schemas.microsoft.com/office/drawing/2014/main" id="{CDBDD827-7A08-4534-86EB-34C5C8450622}"/>
               </a:ext>
             </a:extLst>
           </p:cNvPr>
@@ -4881,7 +4910,7 @@
           <p:cNvPr id="6" name="Slide Number Placeholder 5">
             <a:extLst>
               <a:ext uri="{FF2B5EF4-FFF2-40B4-BE49-F238E27FC236}">
-                <a16:creationId xmlns:a16="http://schemas.microsoft.com/office/drawing/2014/main" id="{1E2619E4-EF6D-46A0-9A3F-9A732D2D819A}"/>
+                <a16:creationId xmlns:a16="http://schemas.microsoft.com/office/drawing/2014/main" id="{4393C6A1-8542-49B2-84CE-1FFA40E83FF9}"/>
               </a:ext>
             </a:extLst>
           </p:cNvPr>
@@ -4946,7 +4975,7 @@
           <a:lstStyle/>
           <a:p>
             <a:r>
-              <a:t>Java 8 Features</a:t>
+              <a:t>Basic Concepts in Java</a:t>
             </a:r>
           </a:p>
         </p:txBody>
@@ -4967,17 +4996,17 @@
           <a:lstStyle/>
           <a:p>
             <a:r>
-              <a:t>Lambda Expressions help simplify coding and make it more flexible.</a:t>
-            </a:r>
-          </a:p>
-          <a:p>
-            <a:r>
-              <a:t>Stream API makes it easy to process collections of objects.</a:t>
-            </a:r>
-          </a:p>
-          <a:p>
-            <a:r>
-              <a:t>The improved Date and Time API helps handle date and time more effectively.</a:t>
+              <a:t>Variables are used to store information.</a:t>
+            </a:r>
+          </a:p>
+          <a:p>
+            <a:r>
+              <a:t>Java has several primitive data types like int, char, and boolean.</a:t>
+            </a:r>
+          </a:p>
+          <a:p>
+            <a:r>
+              <a:t>Basic operators include addition, subtraction, multiplication, etc.</a:t>
             </a:r>
           </a:p>
         </p:txBody>
@@ -4987,7 +5016,7 @@
           <p:cNvPr id="4" name="Date Placeholder 3">
             <a:extLst>
               <a:ext uri="{FF2B5EF4-FFF2-40B4-BE49-F238E27FC236}">
-                <a16:creationId xmlns:a16="http://schemas.microsoft.com/office/drawing/2014/main" id="{149A4939-4928-4FD6-A204-828CAF4E5DD4}"/>
+                <a16:creationId xmlns:a16="http://schemas.microsoft.com/office/drawing/2014/main" id="{FE54D3CD-48D8-4544-B3FF-CEFC4924FCBC}"/>
               </a:ext>
             </a:extLst>
           </p:cNvPr>
@@ -5003,7 +5032,7 @@
           <a:bodyPr/>
           <a:lstStyle/>
           <a:p>
-            <a:fld id="{E3A42FC4-688E-4BFE-9B50-9191488E774A}" type="datetime1">
+            <a:fld id="{ADA47287-F64F-4BFB-8B4E-FF16577CD6D4}" type="datetime1">
               <a:rPr lang="en-US" smtClean="0"/>
               <a:t>12/10/2024</a:t>
             </a:fld>
@@ -5016,7 +5045,7 @@
           <p:cNvPr id="5" name="Footer Placeholder 4">
             <a:extLst>
               <a:ext uri="{FF2B5EF4-FFF2-40B4-BE49-F238E27FC236}">
-                <a16:creationId xmlns:a16="http://schemas.microsoft.com/office/drawing/2014/main" id="{DB67F963-9DD8-4A98-8AE5-F49A0BDB319B}"/>
+                <a16:creationId xmlns:a16="http://schemas.microsoft.com/office/drawing/2014/main" id="{8681563A-3FBE-4299-B083-560AFC2101FE}"/>
               </a:ext>
             </a:extLst>
           </p:cNvPr>
@@ -5045,7 +5074,7 @@
           <p:cNvPr id="6" name="Slide Number Placeholder 5">
             <a:extLst>
               <a:ext uri="{FF2B5EF4-FFF2-40B4-BE49-F238E27FC236}">
-                <a16:creationId xmlns:a16="http://schemas.microsoft.com/office/drawing/2014/main" id="{E413999E-A056-4406-B24B-39E322870C9F}"/>
+                <a16:creationId xmlns:a16="http://schemas.microsoft.com/office/drawing/2014/main" id="{1E2619E4-EF6D-46A0-9A3F-9A732D2D819A}"/>
               </a:ext>
             </a:extLst>
           </p:cNvPr>
@@ -5110,7 +5139,7 @@
           <a:lstStyle/>
           <a:p>
             <a:r>
-              <a:t>Writing Simple Java Programs</a:t>
+              <a:t>Java 8 Features</a:t>
             </a:r>
           </a:p>
         </p:txBody>
@@ -5131,12 +5160,17 @@
           <a:lstStyle/>
           <a:p>
             <a:r>
-              <a:t>A Java program is structured around classes and methods.</a:t>
-            </a:r>
-          </a:p>
-          <a:p>
-            <a:r>
-              <a:t>Examples include using variables, control statements like if-else, and loops like for and while.</a:t>
+              <a:t>Lambda Expressions help simplify coding and make it more flexible.</a:t>
+            </a:r>
+          </a:p>
+          <a:p>
+            <a:r>
+              <a:t>Stream API makes it easy to process collections of objects.</a:t>
+            </a:r>
+          </a:p>
+          <a:p>
+            <a:r>
+              <a:t>The improved Date and Time API helps handle date and time more effectively.</a:t>
             </a:r>
           </a:p>
         </p:txBody>
@@ -5146,7 +5180,7 @@
           <p:cNvPr id="4" name="Date Placeholder 3">
             <a:extLst>
               <a:ext uri="{FF2B5EF4-FFF2-40B4-BE49-F238E27FC236}">
-                <a16:creationId xmlns:a16="http://schemas.microsoft.com/office/drawing/2014/main" id="{50E85653-5A87-46AB-9AF9-E1407E5AA0AE}"/>
+                <a16:creationId xmlns:a16="http://schemas.microsoft.com/office/drawing/2014/main" id="{149A4939-4928-4FD6-A204-828CAF4E5DD4}"/>
               </a:ext>
             </a:extLst>
           </p:cNvPr>
@@ -5162,7 +5196,7 @@
           <a:bodyPr/>
           <a:lstStyle/>
           <a:p>
-            <a:fld id="{E0483B01-A1DE-4E33-9DBC-594529981B16}" type="datetime1">
+            <a:fld id="{E3A42FC4-688E-4BFE-9B50-9191488E774A}" type="datetime1">
               <a:rPr lang="en-US" smtClean="0"/>
               <a:t>12/10/2024</a:t>
             </a:fld>
@@ -5175,7 +5209,7 @@
           <p:cNvPr id="5" name="Footer Placeholder 4">
             <a:extLst>
               <a:ext uri="{FF2B5EF4-FFF2-40B4-BE49-F238E27FC236}">
-                <a16:creationId xmlns:a16="http://schemas.microsoft.com/office/drawing/2014/main" id="{DDB9C2B8-81A3-414A-A20A-2E1B84D5836E}"/>
+                <a16:creationId xmlns:a16="http://schemas.microsoft.com/office/drawing/2014/main" id="{DB67F963-9DD8-4A98-8AE5-F49A0BDB319B}"/>
               </a:ext>
             </a:extLst>
           </p:cNvPr>
@@ -5204,7 +5238,7 @@
           <p:cNvPr id="6" name="Slide Number Placeholder 5">
             <a:extLst>
               <a:ext uri="{FF2B5EF4-FFF2-40B4-BE49-F238E27FC236}">
-                <a16:creationId xmlns:a16="http://schemas.microsoft.com/office/drawing/2014/main" id="{1958A7FA-8AC9-4A3E-A49E-B75DBA2E03D0}"/>
+                <a16:creationId xmlns:a16="http://schemas.microsoft.com/office/drawing/2014/main" id="{E413999E-A056-4406-B24B-39E322870C9F}"/>
               </a:ext>
             </a:extLst>
           </p:cNvPr>
@@ -5269,7 +5303,7 @@
           <a:lstStyle/>
           <a:p>
             <a:r>
-              <a:t>Interactive Activity</a:t>
+              <a:t>Writing Simple Java Programs</a:t>
             </a:r>
           </a:p>
         </p:txBody>
@@ -5290,12 +5324,12 @@
           <a:lstStyle/>
           <a:p>
             <a:r>
-              <a:t>A coding exercise to engage students with a simple task they can try on their computers.</a:t>
-            </a:r>
-          </a:p>
-          <a:p>
-            <a:r>
-              <a:t>Example problem: Write a program to calculate the sum of numbers from 1 to 10.</a:t>
+              <a:t>A Java program is structured around classes and methods.</a:t>
+            </a:r>
+          </a:p>
+          <a:p>
+            <a:r>
+              <a:t>Examples include using variables, control statements like if-else, and loops like for and while.</a:t>
             </a:r>
           </a:p>
         </p:txBody>
@@ -5305,7 +5339,7 @@
           <p:cNvPr id="4" name="Date Placeholder 3">
             <a:extLst>
               <a:ext uri="{FF2B5EF4-FFF2-40B4-BE49-F238E27FC236}">
-                <a16:creationId xmlns:a16="http://schemas.microsoft.com/office/drawing/2014/main" id="{7542D02D-D3FE-45A4-B5AC-5F8FAABC9DC2}"/>
+                <a16:creationId xmlns:a16="http://schemas.microsoft.com/office/drawing/2014/main" id="{50E85653-5A87-46AB-9AF9-E1407E5AA0AE}"/>
               </a:ext>
             </a:extLst>
           </p:cNvPr>
@@ -5321,7 +5355,7 @@
           <a:bodyPr/>
           <a:lstStyle/>
           <a:p>
-            <a:fld id="{19165F3D-1F15-47D1-896B-708A6FCA01A4}" type="datetime1">
+            <a:fld id="{E0483B01-A1DE-4E33-9DBC-594529981B16}" type="datetime1">
               <a:rPr lang="en-US" smtClean="0"/>
               <a:t>12/10/2024</a:t>
             </a:fld>
@@ -5334,7 +5368,7 @@
           <p:cNvPr id="5" name="Footer Placeholder 4">
             <a:extLst>
               <a:ext uri="{FF2B5EF4-FFF2-40B4-BE49-F238E27FC236}">
-                <a16:creationId xmlns:a16="http://schemas.microsoft.com/office/drawing/2014/main" id="{FFEC6B1F-A443-45A2-8B22-1F7F2B0E0B42}"/>
+                <a16:creationId xmlns:a16="http://schemas.microsoft.com/office/drawing/2014/main" id="{DDB9C2B8-81A3-414A-A20A-2E1B84D5836E}"/>
               </a:ext>
             </a:extLst>
           </p:cNvPr>
@@ -5363,7 +5397,7 @@
           <p:cNvPr id="6" name="Slide Number Placeholder 5">
             <a:extLst>
               <a:ext uri="{FF2B5EF4-FFF2-40B4-BE49-F238E27FC236}">
-                <a16:creationId xmlns:a16="http://schemas.microsoft.com/office/drawing/2014/main" id="{07AC6F16-BD2D-4DFD-A248-E685E4A27C82}"/>
+                <a16:creationId xmlns:a16="http://schemas.microsoft.com/office/drawing/2014/main" id="{1958A7FA-8AC9-4A3E-A49E-B75DBA2E03D0}"/>
               </a:ext>
             </a:extLst>
           </p:cNvPr>
@@ -5428,7 +5462,7 @@
           <a:lstStyle/>
           <a:p>
             <a:r>
-              <a:t>Resources to Learn More</a:t>
+              <a:t>Interactive Activity</a:t>
             </a:r>
           </a:p>
         </p:txBody>
@@ -5449,17 +5483,12 @@
           <a:lstStyle/>
           <a:p>
             <a:r>
-              <a:t>Recommended books include 'Head First Java'.</a:t>
-            </a:r>
-          </a:p>
-          <a:p>
-            <a:r>
-              <a:t>Online resources like Codecademy, Coursera, and YouTube channels are helpful.</a:t>
-            </a:r>
-          </a:p>
-          <a:p>
-            <a:r>
-              <a:t>Practice platforms like HackerRank and LeetCode are good for practicing Java.</a:t>
+              <a:t>A coding exercise to engage students with a simple task they can try on their computers.</a:t>
+            </a:r>
+          </a:p>
+          <a:p>
+            <a:r>
+              <a:t>Example problem: Write a program to calculate the sum of numbers from 1 to 10.</a:t>
             </a:r>
           </a:p>
         </p:txBody>
@@ -5469,7 +5498,7 @@
           <p:cNvPr id="4" name="Date Placeholder 3">
             <a:extLst>
               <a:ext uri="{FF2B5EF4-FFF2-40B4-BE49-F238E27FC236}">
-                <a16:creationId xmlns:a16="http://schemas.microsoft.com/office/drawing/2014/main" id="{2344EB75-93D1-4F10-92A1-B5A422ED31D7}"/>
+                <a16:creationId xmlns:a16="http://schemas.microsoft.com/office/drawing/2014/main" id="{7542D02D-D3FE-45A4-B5AC-5F8FAABC9DC2}"/>
               </a:ext>
             </a:extLst>
           </p:cNvPr>
@@ -5485,7 +5514,7 @@
           <a:bodyPr/>
           <a:lstStyle/>
           <a:p>
-            <a:fld id="{BE70A24C-7B9A-4449-8CF0-B07C104FACBC}" type="datetime1">
+            <a:fld id="{19165F3D-1F15-47D1-896B-708A6FCA01A4}" type="datetime1">
               <a:rPr lang="en-US" smtClean="0"/>
               <a:t>12/10/2024</a:t>
             </a:fld>
@@ -5498,7 +5527,7 @@
           <p:cNvPr id="5" name="Footer Placeholder 4">
             <a:extLst>
               <a:ext uri="{FF2B5EF4-FFF2-40B4-BE49-F238E27FC236}">
-                <a16:creationId xmlns:a16="http://schemas.microsoft.com/office/drawing/2014/main" id="{6D022F12-E624-4AD7-B750-6ECCC32D4620}"/>
+                <a16:creationId xmlns:a16="http://schemas.microsoft.com/office/drawing/2014/main" id="{FFEC6B1F-A443-45A2-8B22-1F7F2B0E0B42}"/>
               </a:ext>
             </a:extLst>
           </p:cNvPr>
@@ -5527,7 +5556,7 @@
           <p:cNvPr id="6" name="Slide Number Placeholder 5">
             <a:extLst>
               <a:ext uri="{FF2B5EF4-FFF2-40B4-BE49-F238E27FC236}">
-                <a16:creationId xmlns:a16="http://schemas.microsoft.com/office/drawing/2014/main" id="{F317A065-841B-4456-8BE7-1981A466F70B}"/>
+                <a16:creationId xmlns:a16="http://schemas.microsoft.com/office/drawing/2014/main" id="{07AC6F16-BD2D-4DFD-A248-E685E4A27C82}"/>
               </a:ext>
             </a:extLst>
           </p:cNvPr>
@@ -5592,7 +5621,7 @@
           <a:lstStyle/>
           <a:p>
             <a:r>
-              <a:t>Conclusion and Q&amp;A</a:t>
+              <a:t>Resources to Learn More</a:t>
             </a:r>
           </a:p>
         </p:txBody>
@@ -5613,12 +5642,17 @@
           <a:lstStyle/>
           <a:p>
             <a:r>
-              <a:t>A recap of what was covered in the presentation.</a:t>
-            </a:r>
-          </a:p>
-          <a:p>
-            <a:r>
-              <a:t>Encouragement for students to ask questions to clarify any doubts.</a:t>
+              <a:t>Recommended books include 'Head First Java'.</a:t>
+            </a:r>
+          </a:p>
+          <a:p>
+            <a:r>
+              <a:t>Online resources like Codecademy, Coursera, and YouTube channels are helpful.</a:t>
+            </a:r>
+          </a:p>
+          <a:p>
+            <a:r>
+              <a:t>Practice platforms like HackerRank and LeetCode are good for practicing Java.</a:t>
             </a:r>
           </a:p>
         </p:txBody>
@@ -5628,7 +5662,7 @@
           <p:cNvPr id="4" name="Date Placeholder 3">
             <a:extLst>
               <a:ext uri="{FF2B5EF4-FFF2-40B4-BE49-F238E27FC236}">
-                <a16:creationId xmlns:a16="http://schemas.microsoft.com/office/drawing/2014/main" id="{F63475D3-4B2F-4E21-8187-E4CA0A2E22B6}"/>
+                <a16:creationId xmlns:a16="http://schemas.microsoft.com/office/drawing/2014/main" id="{2344EB75-93D1-4F10-92A1-B5A422ED31D7}"/>
               </a:ext>
             </a:extLst>
           </p:cNvPr>
@@ -5644,7 +5678,7 @@
           <a:bodyPr/>
           <a:lstStyle/>
           <a:p>
-            <a:fld id="{8FA9BE0A-8431-428D-AB74-F284A487038B}" type="datetime1">
+            <a:fld id="{BE70A24C-7B9A-4449-8CF0-B07C104FACBC}" type="datetime1">
               <a:rPr lang="en-US" smtClean="0"/>
               <a:t>12/10/2024</a:t>
             </a:fld>
@@ -5657,7 +5691,7 @@
           <p:cNvPr id="5" name="Footer Placeholder 4">
             <a:extLst>
               <a:ext uri="{FF2B5EF4-FFF2-40B4-BE49-F238E27FC236}">
-                <a16:creationId xmlns:a16="http://schemas.microsoft.com/office/drawing/2014/main" id="{5FE445AF-8AE3-401B-B994-FA9D5E173F4A}"/>
+                <a16:creationId xmlns:a16="http://schemas.microsoft.com/office/drawing/2014/main" id="{6D022F12-E624-4AD7-B750-6ECCC32D4620}"/>
               </a:ext>
             </a:extLst>
           </p:cNvPr>
@@ -5686,7 +5720,7 @@
           <p:cNvPr id="6" name="Slide Number Placeholder 5">
             <a:extLst>
               <a:ext uri="{FF2B5EF4-FFF2-40B4-BE49-F238E27FC236}">
-                <a16:creationId xmlns:a16="http://schemas.microsoft.com/office/drawing/2014/main" id="{6DFD37D3-273D-4962-8252-943F72493B40}"/>
+                <a16:creationId xmlns:a16="http://schemas.microsoft.com/office/drawing/2014/main" id="{F317A065-841B-4456-8BE7-1981A466F70B}"/>
               </a:ext>
             </a:extLst>
           </p:cNvPr>
@@ -5897,6 +5931,165 @@
             <a:fld id="{C1FF6DA9-008F-8B48-92A6-B652298478BF}" type="slidenum">
               <a:rPr lang="en-US" smtClean="0"/>
               <a:t>2</a:t>
+            </a:fld>
+            <a:endParaRPr lang="en-US"/>
+          </a:p>
+        </p:txBody>
+      </p:sp>
+    </p:spTree>
+  </p:cSld>
+  <p:clrMapOvr>
+    <a:masterClrMapping/>
+  </p:clrMapOvr>
+</p:sld>
+</file>
+
+<file path=ppt/slides/slide20.xml><?xml version="1.0" encoding="utf-8"?>
+<p:sld xmlns:a="http://schemas.openxmlformats.org/drawingml/2006/main" xmlns:r="http://schemas.openxmlformats.org/officeDocument/2006/relationships" xmlns:p="http://schemas.openxmlformats.org/presentationml/2006/main">
+  <p:cSld>
+    <p:spTree>
+      <p:nvGrpSpPr>
+        <p:cNvPr id="1" name=""/>
+        <p:cNvGrpSpPr/>
+        <p:nvPr/>
+      </p:nvGrpSpPr>
+      <p:grpSpPr>
+        <a:xfrm>
+          <a:off x="0" y="0"/>
+          <a:ext cx="0" cy="0"/>
+          <a:chOff x="0" y="0"/>
+          <a:chExt cx="0" cy="0"/>
+        </a:xfrm>
+      </p:grpSpPr>
+      <p:sp>
+        <p:nvSpPr>
+          <p:cNvPr id="2" name="Title 1"/>
+          <p:cNvSpPr>
+            <a:spLocks noGrp="1"/>
+          </p:cNvSpPr>
+          <p:nvPr>
+            <p:ph type="title"/>
+          </p:nvPr>
+        </p:nvSpPr>
+        <p:spPr/>
+        <p:txBody>
+          <a:bodyPr/>
+          <a:lstStyle/>
+          <a:p>
+            <a:r>
+              <a:t>Conclusion and Q&amp;A</a:t>
+            </a:r>
+          </a:p>
+        </p:txBody>
+      </p:sp>
+      <p:sp>
+        <p:nvSpPr>
+          <p:cNvPr id="3" name="Content Placeholder 2"/>
+          <p:cNvSpPr>
+            <a:spLocks noGrp="1"/>
+          </p:cNvSpPr>
+          <p:nvPr>
+            <p:ph idx="1"/>
+          </p:nvPr>
+        </p:nvSpPr>
+        <p:spPr/>
+        <p:txBody>
+          <a:bodyPr/>
+          <a:lstStyle/>
+          <a:p>
+            <a:r>
+              <a:t>A recap of what was covered in the presentation.</a:t>
+            </a:r>
+          </a:p>
+          <a:p>
+            <a:r>
+              <a:t>Encouragement for students to ask questions to clarify any doubts.</a:t>
+            </a:r>
+          </a:p>
+        </p:txBody>
+      </p:sp>
+      <p:sp>
+        <p:nvSpPr>
+          <p:cNvPr id="4" name="Date Placeholder 3">
+            <a:extLst>
+              <a:ext uri="{FF2B5EF4-FFF2-40B4-BE49-F238E27FC236}">
+                <a16:creationId xmlns:a16="http://schemas.microsoft.com/office/drawing/2014/main" id="{F63475D3-4B2F-4E21-8187-E4CA0A2E22B6}"/>
+              </a:ext>
+            </a:extLst>
+          </p:cNvPr>
+          <p:cNvSpPr>
+            <a:spLocks noGrp="1"/>
+          </p:cNvSpPr>
+          <p:nvPr>
+            <p:ph type="dt" sz="half" idx="10"/>
+          </p:nvPr>
+        </p:nvSpPr>
+        <p:spPr/>
+        <p:txBody>
+          <a:bodyPr/>
+          <a:lstStyle/>
+          <a:p>
+            <a:fld id="{8FA9BE0A-8431-428D-AB74-F284A487038B}" type="datetime1">
+              <a:rPr lang="en-US" smtClean="0"/>
+              <a:t>12/10/2024</a:t>
+            </a:fld>
+            <a:endParaRPr lang="en-US"/>
+          </a:p>
+        </p:txBody>
+      </p:sp>
+      <p:sp>
+        <p:nvSpPr>
+          <p:cNvPr id="5" name="Footer Placeholder 4">
+            <a:extLst>
+              <a:ext uri="{FF2B5EF4-FFF2-40B4-BE49-F238E27FC236}">
+                <a16:creationId xmlns:a16="http://schemas.microsoft.com/office/drawing/2014/main" id="{5FE445AF-8AE3-401B-B994-FA9D5E173F4A}"/>
+              </a:ext>
+            </a:extLst>
+          </p:cNvPr>
+          <p:cNvSpPr>
+            <a:spLocks noGrp="1"/>
+          </p:cNvSpPr>
+          <p:nvPr>
+            <p:ph type="ftr" sz="quarter" idx="11"/>
+          </p:nvPr>
+        </p:nvSpPr>
+        <p:spPr/>
+        <p:txBody>
+          <a:bodyPr/>
+          <a:lstStyle/>
+          <a:p>
+            <a:r>
+              <a:rPr lang="es-ES"/>
+              <a:t>GitHubRepo: https://github.com/develop2clickcomputers/LearnJavaWithSan</a:t>
+            </a:r>
+            <a:endParaRPr lang="en-US"/>
+          </a:p>
+        </p:txBody>
+      </p:sp>
+      <p:sp>
+        <p:nvSpPr>
+          <p:cNvPr id="6" name="Slide Number Placeholder 5">
+            <a:extLst>
+              <a:ext uri="{FF2B5EF4-FFF2-40B4-BE49-F238E27FC236}">
+                <a16:creationId xmlns:a16="http://schemas.microsoft.com/office/drawing/2014/main" id="{6DFD37D3-273D-4962-8252-943F72493B40}"/>
+              </a:ext>
+            </a:extLst>
+          </p:cNvPr>
+          <p:cNvSpPr>
+            <a:spLocks noGrp="1"/>
+          </p:cNvSpPr>
+          <p:nvPr>
+            <p:ph type="sldNum" sz="quarter" idx="12"/>
+          </p:nvPr>
+        </p:nvSpPr>
+        <p:spPr/>
+        <p:txBody>
+          <a:bodyPr/>
+          <a:lstStyle/>
+          <a:p>
+            <a:fld id="{C1FF6DA9-008F-8B48-92A6-B652298478BF}" type="slidenum">
+              <a:rPr lang="en-US" smtClean="0"/>
+              <a:t>20</a:t>
             </a:fld>
             <a:endParaRPr lang="en-US"/>
           </a:p>

</xml_diff>